<commit_message>
added new slides to the presentation
</commit_message>
<xml_diff>
--- a/Презентация1.pptx
+++ b/Презентация1.pptx
@@ -5,10 +5,10 @@
     <p:sldMasterId id="2147483725" r:id="rId4"/>
   </p:sldMasterIdLst>
   <p:notesMasterIdLst>
-    <p:notesMasterId r:id="rId11"/>
+    <p:notesMasterId r:id="rId13"/>
   </p:notesMasterIdLst>
   <p:handoutMasterIdLst>
-    <p:handoutMasterId r:id="rId12"/>
+    <p:handoutMasterId r:id="rId14"/>
   </p:handoutMasterIdLst>
   <p:sldIdLst>
     <p:sldId id="348" r:id="rId5"/>
@@ -17,6 +17,8 @@
     <p:sldId id="351" r:id="rId8"/>
     <p:sldId id="352" r:id="rId9"/>
     <p:sldId id="353" r:id="rId10"/>
+    <p:sldId id="354" r:id="rId11"/>
+    <p:sldId id="355" r:id="rId12"/>
   </p:sldIdLst>
   <p:sldSz cx="12192000" cy="6858000"/>
   <p:notesSz cx="6858000" cy="9144000"/>
@@ -210,7 +212,7 @@
             <a:pPr rtl="0"/>
             <a:fld id="{8EB596BA-F330-4785-8461-F74708FFCA50}" type="datetime1">
               <a:rPr lang="ru-RU" smtClean="0"/>
-              <a:t>27.02.2021</a:t>
+              <a:t>28.02.2021</a:t>
             </a:fld>
             <a:endParaRPr lang="ru-RU" dirty="0"/>
           </a:p>
@@ -379,7 +381,7 @@
             <a:fld id="{75E7E9F4-7ED8-495D-B52D-5485A5BC0ACA}" type="datetime1">
               <a:rPr lang="ru-RU" noProof="0" smtClean="0"/>
               <a:pPr/>
-              <a:t>27.02.2021</a:t>
+              <a:t>28.02.2021</a:t>
             </a:fld>
             <a:endParaRPr lang="ru-RU" noProof="0" dirty="0"/>
           </a:p>
@@ -905,7 +907,7 @@
             <a:pPr rtl="0"/>
             <a:fld id="{42F2DED7-F6AC-4866-8138-11B328ED7527}" type="datetime1">
               <a:rPr lang="ru-RU" noProof="0" smtClean="0"/>
-              <a:t>27.02.2021</a:t>
+              <a:t>28.02.2021</a:t>
             </a:fld>
             <a:endParaRPr lang="ru-RU" noProof="0" dirty="0"/>
           </a:p>
@@ -1500,7 +1502,7 @@
             <a:pPr rtl="0"/>
             <a:fld id="{AB14CD44-37FB-48CC-A24D-89C3A643DD86}" type="datetime1">
               <a:rPr lang="ru-RU" noProof="0" smtClean="0"/>
-              <a:t>27.02.2021</a:t>
+              <a:t>28.02.2021</a:t>
             </a:fld>
             <a:endParaRPr lang="ru-RU" noProof="0" dirty="0"/>
           </a:p>
@@ -1684,7 +1686,7 @@
             <a:pPr rtl="0"/>
             <a:fld id="{AB14CD44-37FB-48CC-A24D-89C3A643DD86}" type="datetime1">
               <a:rPr lang="ru-RU" noProof="0" smtClean="0"/>
-              <a:t>27.02.2021</a:t>
+              <a:t>28.02.2021</a:t>
             </a:fld>
             <a:endParaRPr lang="ru-RU" noProof="0" dirty="0"/>
           </a:p>
@@ -1841,7 +1843,7 @@
             <a:pPr rtl="0"/>
             <a:fld id="{2DD0CC0D-F4E8-4EB2-A425-24C0A08BF2ED}" type="datetime1">
               <a:rPr lang="ru-RU" noProof="0" smtClean="0"/>
-              <a:t>27.02.2021</a:t>
+              <a:t>28.02.2021</a:t>
             </a:fld>
             <a:endParaRPr lang="ru-RU" noProof="0" dirty="0"/>
           </a:p>
@@ -2542,7 +2544,7 @@
             <a:pPr rtl="0"/>
             <a:fld id="{11D365CB-744A-4AFA-AFC9-892345BE9421}" type="datetime1">
               <a:rPr lang="ru-RU" noProof="0" smtClean="0"/>
-              <a:t>27.02.2021</a:t>
+              <a:t>28.02.2021</a:t>
             </a:fld>
             <a:endParaRPr lang="ru-RU" noProof="0" dirty="0"/>
           </a:p>
@@ -3629,7 +3631,7 @@
             <a:pPr rtl="0"/>
             <a:fld id="{4B5B89D9-0013-4DF9-B570-27DC755C2F3F}" type="datetime1">
               <a:rPr lang="ru-RU" noProof="0" smtClean="0"/>
-              <a:t>27.02.2021</a:t>
+              <a:t>28.02.2021</a:t>
             </a:fld>
             <a:endParaRPr lang="ru-RU" noProof="0" dirty="0"/>
           </a:p>
@@ -4460,7 +4462,7 @@
             <a:pPr rtl="0"/>
             <a:fld id="{17A79461-147E-4321-BCEB-239C620C895A}" type="datetime1">
               <a:rPr lang="ru-RU" noProof="0" smtClean="0"/>
-              <a:t>27.02.2021</a:t>
+              <a:t>28.02.2021</a:t>
             </a:fld>
             <a:endParaRPr lang="ru-RU" noProof="0" dirty="0"/>
           </a:p>
@@ -5417,7 +5419,7 @@
             <a:pPr rtl="0"/>
             <a:fld id="{0C74DA27-089F-41DB-9018-6804069C0386}" type="datetime1">
               <a:rPr lang="ru-RU" noProof="0" smtClean="0"/>
-              <a:t>27.02.2021</a:t>
+              <a:t>28.02.2021</a:t>
             </a:fld>
             <a:endParaRPr lang="ru-RU" noProof="0" dirty="0"/>
           </a:p>
@@ -6118,7 +6120,7 @@
             <a:pPr rtl="0"/>
             <a:fld id="{4CF5337F-F302-414C-9999-654EC56929E7}" type="datetime1">
               <a:rPr lang="ru-RU" noProof="0" smtClean="0"/>
-              <a:t>27.02.2021</a:t>
+              <a:t>28.02.2021</a:t>
             </a:fld>
             <a:endParaRPr lang="ru-RU" noProof="0" dirty="0"/>
           </a:p>
@@ -6819,7 +6821,7 @@
             <a:pPr rtl="0"/>
             <a:fld id="{FF63DE5C-7286-415E-BD66-0312B5E1AB50}" type="datetime1">
               <a:rPr lang="ru-RU" noProof="0" smtClean="0"/>
-              <a:t>27.02.2021</a:t>
+              <a:t>28.02.2021</a:t>
             </a:fld>
             <a:endParaRPr lang="ru-RU" noProof="0" dirty="0"/>
           </a:p>
@@ -7600,7 +7602,7 @@
             <a:pPr rtl="0"/>
             <a:fld id="{2DD0CC0D-F4E8-4EB2-A425-24C0A08BF2ED}" type="datetime1">
               <a:rPr lang="ru-RU" noProof="0" smtClean="0"/>
-              <a:t>27.02.2021</a:t>
+              <a:t>28.02.2021</a:t>
             </a:fld>
             <a:endParaRPr lang="ru-RU" noProof="0" dirty="0"/>
           </a:p>
@@ -8422,7 +8424,7 @@
             <a:pPr rtl="0"/>
             <a:fld id="{4B5B89D9-0013-4DF9-B570-27DC755C2F3F}" type="datetime1">
               <a:rPr lang="ru-RU" noProof="0" smtClean="0"/>
-              <a:t>27.02.2021</a:t>
+              <a:t>28.02.2021</a:t>
             </a:fld>
             <a:endParaRPr lang="ru-RU" noProof="0" dirty="0"/>
           </a:p>
@@ -9420,7 +9422,7 @@
             <a:pPr rtl="0"/>
             <a:fld id="{17A79461-147E-4321-BCEB-239C620C895A}" type="datetime1">
               <a:rPr lang="ru-RU" noProof="0" smtClean="0"/>
-              <a:t>27.02.2021</a:t>
+              <a:t>28.02.2021</a:t>
             </a:fld>
             <a:endParaRPr lang="ru-RU" noProof="0" dirty="0"/>
           </a:p>
@@ -10442,7 +10444,7 @@
             <a:pPr rtl="0"/>
             <a:fld id="{0C74DA27-089F-41DB-9018-6804069C0386}" type="datetime1">
               <a:rPr lang="ru-RU" noProof="0" smtClean="0"/>
-              <a:t>27.02.2021</a:t>
+              <a:t>28.02.2021</a:t>
             </a:fld>
             <a:endParaRPr lang="ru-RU" noProof="0" dirty="0"/>
           </a:p>
@@ -11105,7 +11107,7 @@
             <a:pPr rtl="0"/>
             <a:fld id="{4CF5337F-F302-414C-9999-654EC56929E7}" type="datetime1">
               <a:rPr lang="ru-RU" noProof="0" smtClean="0"/>
-              <a:t>27.02.2021</a:t>
+              <a:t>28.02.2021</a:t>
             </a:fld>
             <a:endParaRPr lang="ru-RU" noProof="0" dirty="0"/>
           </a:p>
@@ -11745,7 +11747,7 @@
             <a:pPr rtl="0"/>
             <a:fld id="{05F888F6-BA81-4650-96F1-E4BE1E5DDAE1}" type="datetime1">
               <a:rPr lang="ru-RU" noProof="0" smtClean="0"/>
-              <a:t>27.02.2021</a:t>
+              <a:t>28.02.2021</a:t>
             </a:fld>
             <a:endParaRPr lang="ru-RU" noProof="0" dirty="0"/>
           </a:p>
@@ -12094,7 +12096,7 @@
             <a:pPr rtl="0"/>
             <a:fld id="{AB14CD44-37FB-48CC-A24D-89C3A643DD86}" type="datetime1">
               <a:rPr lang="ru-RU" noProof="0" smtClean="0"/>
-              <a:t>27.02.2021</a:t>
+              <a:t>28.02.2021</a:t>
             </a:fld>
             <a:endParaRPr lang="ru-RU" noProof="0" dirty="0"/>
           </a:p>
@@ -12486,7 +12488,7 @@
             <a:pPr rtl="0"/>
             <a:fld id="{AB14CD44-37FB-48CC-A24D-89C3A643DD86}" type="datetime1">
               <a:rPr lang="ru-RU" noProof="0" smtClean="0"/>
-              <a:t>27.02.2021</a:t>
+              <a:t>28.02.2021</a:t>
             </a:fld>
             <a:endParaRPr lang="ru-RU" noProof="0" dirty="0"/>
           </a:p>
@@ -12768,7 +12770,7 @@
             <a:pPr rtl="0"/>
             <a:fld id="{AB14CD44-37FB-48CC-A24D-89C3A643DD86}" type="datetime1">
               <a:rPr lang="ru-RU" noProof="0" smtClean="0"/>
-              <a:t>27.02.2021</a:t>
+              <a:t>28.02.2021</a:t>
             </a:fld>
             <a:endParaRPr lang="ru-RU" noProof="0" dirty="0"/>
           </a:p>
@@ -13419,6 +13421,18 @@
   <p:clrMapOvr>
     <a:masterClrMapping/>
   </p:clrMapOvr>
+  <mc:AlternateContent xmlns:mc="http://schemas.openxmlformats.org/markup-compatibility/2006">
+    <mc:Choice xmlns:p14="http://schemas.microsoft.com/office/powerpoint/2010/main" Requires="p14">
+      <p:transition spd="slow" p14:dur="3400">
+        <p14:reveal/>
+      </p:transition>
+    </mc:Choice>
+    <mc:Fallback>
+      <p:transition spd="slow">
+        <p:fade/>
+      </p:transition>
+    </mc:Fallback>
+  </mc:AlternateContent>
 </p:sld>
 </file>
 
@@ -13611,6 +13625,18 @@
   <p:clrMapOvr>
     <a:masterClrMapping/>
   </p:clrMapOvr>
+  <mc:AlternateContent xmlns:mc="http://schemas.openxmlformats.org/markup-compatibility/2006">
+    <mc:Choice xmlns:p14="http://schemas.microsoft.com/office/powerpoint/2010/main" Requires="p14">
+      <p:transition spd="slow" p14:dur="3400">
+        <p14:reveal/>
+      </p:transition>
+    </mc:Choice>
+    <mc:Fallback>
+      <p:transition spd="slow">
+        <p:fade/>
+      </p:transition>
+    </mc:Fallback>
+  </mc:AlternateContent>
 </p:sld>
 </file>
 
@@ -13785,6 +13811,18 @@
   <p:clrMapOvr>
     <a:masterClrMapping/>
   </p:clrMapOvr>
+  <mc:AlternateContent xmlns:mc="http://schemas.openxmlformats.org/markup-compatibility/2006">
+    <mc:Choice xmlns:p14="http://schemas.microsoft.com/office/powerpoint/2010/main" Requires="p14">
+      <p:transition spd="slow" p14:dur="3400">
+        <p14:reveal/>
+      </p:transition>
+    </mc:Choice>
+    <mc:Fallback>
+      <p:transition spd="slow">
+        <p:fade/>
+      </p:transition>
+    </mc:Fallback>
+  </mc:AlternateContent>
 </p:sld>
 </file>
 
@@ -13824,11 +13862,13 @@
         <p:spPr>
           <a:xfrm>
             <a:off x="1371599" y="336014"/>
-            <a:ext cx="9601200" cy="1485900"/>
+            <a:ext cx="9601200" cy="699572"/>
           </a:xfrm>
         </p:spPr>
         <p:txBody>
-          <a:bodyPr/>
+          <a:bodyPr>
+            <a:normAutofit fontScale="90000"/>
+          </a:bodyPr>
           <a:lstStyle/>
           <a:p>
             <a:r>
@@ -14016,6 +14056,18 @@
   <p:clrMapOvr>
     <a:masterClrMapping/>
   </p:clrMapOvr>
+  <mc:AlternateContent xmlns:mc="http://schemas.openxmlformats.org/markup-compatibility/2006">
+    <mc:Choice xmlns:p14="http://schemas.microsoft.com/office/powerpoint/2010/main" Requires="p14">
+      <p:transition spd="slow" p14:dur="3400">
+        <p14:reveal/>
+      </p:transition>
+    </mc:Choice>
+    <mc:Fallback>
+      <p:transition spd="slow">
+        <p:fade/>
+      </p:transition>
+    </mc:Fallback>
+  </mc:AlternateContent>
 </p:sld>
 </file>
 
@@ -14160,6 +14212,18 @@
   <p:clrMapOvr>
     <a:masterClrMapping/>
   </p:clrMapOvr>
+  <mc:AlternateContent xmlns:mc="http://schemas.openxmlformats.org/markup-compatibility/2006">
+    <mc:Choice xmlns:p14="http://schemas.microsoft.com/office/powerpoint/2010/main" Requires="p14">
+      <p:transition spd="slow" p14:dur="3400">
+        <p14:reveal/>
+      </p:transition>
+    </mc:Choice>
+    <mc:Fallback>
+      <p:transition spd="slow">
+        <p:fade/>
+      </p:transition>
+    </mc:Fallback>
+  </mc:AlternateContent>
 </p:sld>
 </file>
 
@@ -14262,6 +14326,386 @@
   <p:clrMapOvr>
     <a:masterClrMapping/>
   </p:clrMapOvr>
+  <mc:AlternateContent xmlns:mc="http://schemas.openxmlformats.org/markup-compatibility/2006">
+    <mc:Choice xmlns:p14="http://schemas.microsoft.com/office/powerpoint/2010/main" Requires="p14">
+      <p:transition spd="slow" p14:dur="3400">
+        <p14:reveal/>
+      </p:transition>
+    </mc:Choice>
+    <mc:Fallback>
+      <p:transition spd="slow">
+        <p:fade/>
+      </p:transition>
+    </mc:Fallback>
+  </mc:AlternateContent>
+</p:sld>
+</file>
+
+<file path=ppt/slides/slide7.xml><?xml version="1.0" encoding="utf-8"?>
+<p:sld xmlns:a="http://schemas.openxmlformats.org/drawingml/2006/main" xmlns:r="http://schemas.openxmlformats.org/officeDocument/2006/relationships" xmlns:p="http://schemas.openxmlformats.org/presentationml/2006/main">
+  <p:cSld>
+    <p:spTree>
+      <p:nvGrpSpPr>
+        <p:cNvPr id="1" name=""/>
+        <p:cNvGrpSpPr/>
+        <p:nvPr/>
+      </p:nvGrpSpPr>
+      <p:grpSpPr>
+        <a:xfrm>
+          <a:off x="0" y="0"/>
+          <a:ext cx="0" cy="0"/>
+          <a:chOff x="0" y="0"/>
+          <a:chExt cx="0" cy="0"/>
+        </a:xfrm>
+      </p:grpSpPr>
+      <p:sp>
+        <p:nvSpPr>
+          <p:cNvPr id="2" name="Объект 1">
+            <a:extLst>
+              <a:ext uri="{FF2B5EF4-FFF2-40B4-BE49-F238E27FC236}">
+                <a16:creationId xmlns:a16="http://schemas.microsoft.com/office/drawing/2014/main" id="{CC12C760-E668-AE44-9529-182C538F348B}"/>
+              </a:ext>
+            </a:extLst>
+          </p:cNvPr>
+          <p:cNvSpPr>
+            <a:spLocks noGrp="1"/>
+          </p:cNvSpPr>
+          <p:nvPr>
+            <p:ph idx="1"/>
+          </p:nvPr>
+        </p:nvSpPr>
+        <p:spPr>
+          <a:xfrm>
+            <a:off x="1143000" y="1427357"/>
+            <a:ext cx="10058400" cy="4553313"/>
+          </a:xfrm>
+        </p:spPr>
+        <p:txBody>
+          <a:bodyPr/>
+          <a:lstStyle/>
+          <a:p>
+            <a:pPr marL="0" indent="0">
+              <a:buNone/>
+            </a:pPr>
+            <a:r>
+              <a:rPr lang="ru-RU" sz="2400" dirty="0" err="1">
+                <a:latin typeface="Gabriola" pitchFamily="82" charset="0"/>
+              </a:rPr>
+              <a:t>Рабдологический</a:t>
+            </a:r>
+            <a:r>
+              <a:rPr lang="ru-RU" sz="2400" dirty="0">
+                <a:latin typeface="Gabriola" pitchFamily="82" charset="0"/>
+              </a:rPr>
+              <a:t> абак имеет процессы управления, свойственны операционной системе, например:</a:t>
+            </a:r>
+          </a:p>
+          <a:p>
+            <a:pPr>
+              <a:buFont typeface="Arial" panose="020B0604020202020204" pitchFamily="34" charset="0"/>
+              <a:buChar char="•"/>
+            </a:pPr>
+            <a:r>
+              <a:rPr lang="ru-RU" sz="2400" dirty="0">
+                <a:latin typeface="Gabriola" pitchFamily="82" charset="0"/>
+              </a:rPr>
+              <a:t>Устройство разделяет производственный процесс на элементарные операции; </a:t>
+            </a:r>
+          </a:p>
+          <a:p>
+            <a:pPr>
+              <a:buFont typeface="Arial" panose="020B0604020202020204" pitchFamily="34" charset="0"/>
+              <a:buChar char="•"/>
+            </a:pPr>
+            <a:r>
+              <a:rPr lang="ru-RU" sz="2400" dirty="0">
+                <a:latin typeface="Gabriola" pitchFamily="82" charset="0"/>
+              </a:rPr>
+              <a:t>Объединяет результаты операций</a:t>
+            </a:r>
+          </a:p>
+          <a:p>
+            <a:pPr>
+              <a:buFont typeface="Arial" panose="020B0604020202020204" pitchFamily="34" charset="0"/>
+              <a:buChar char="•"/>
+            </a:pPr>
+            <a:r>
+              <a:rPr lang="ru-RU" sz="2400" dirty="0">
+                <a:latin typeface="Gabriola" pitchFamily="82" charset="0"/>
+              </a:rPr>
+              <a:t>автоматизация выполнения операции с использованием </a:t>
+            </a:r>
+            <a:r>
+              <a:rPr lang="ru-RU" sz="2400" dirty="0" err="1">
+                <a:latin typeface="Gabriola" pitchFamily="82" charset="0"/>
+              </a:rPr>
+              <a:t>Рабдологического</a:t>
+            </a:r>
+            <a:r>
+              <a:rPr lang="ru-RU" sz="2400" dirty="0">
+                <a:latin typeface="Gabriola" pitchFamily="82" charset="0"/>
+              </a:rPr>
+              <a:t> абака</a:t>
+            </a:r>
+          </a:p>
+          <a:p>
+            <a:pPr marL="0" indent="0">
+              <a:buNone/>
+            </a:pPr>
+            <a:r>
+              <a:rPr lang="ru-RU" dirty="0">
+                <a:latin typeface="Gabriola" pitchFamily="82" charset="0"/>
+              </a:rPr>
+              <a:t> </a:t>
+            </a:r>
+          </a:p>
+        </p:txBody>
+      </p:sp>
+      <p:sp>
+        <p:nvSpPr>
+          <p:cNvPr id="3" name="Заголовок 2">
+            <a:extLst>
+              <a:ext uri="{FF2B5EF4-FFF2-40B4-BE49-F238E27FC236}">
+                <a16:creationId xmlns:a16="http://schemas.microsoft.com/office/drawing/2014/main" id="{FA34D240-8CF5-4949-8EB6-6F7E1BE39A4C}"/>
+              </a:ext>
+            </a:extLst>
+          </p:cNvPr>
+          <p:cNvSpPr>
+            <a:spLocks noGrp="1"/>
+          </p:cNvSpPr>
+          <p:nvPr>
+            <p:ph type="title"/>
+          </p:nvPr>
+        </p:nvSpPr>
+        <p:spPr>
+          <a:xfrm>
+            <a:off x="1143000" y="321277"/>
+            <a:ext cx="10058400" cy="1106080"/>
+          </a:xfrm>
+        </p:spPr>
+        <p:txBody>
+          <a:bodyPr>
+            <a:normAutofit/>
+          </a:bodyPr>
+          <a:lstStyle/>
+          <a:p>
+            <a:pPr algn="ctr"/>
+            <a:r>
+              <a:rPr lang="ru-RU" sz="2800" dirty="0">
+                <a:latin typeface="Gabriola" pitchFamily="82" charset="0"/>
+              </a:rPr>
+              <a:t>Процессы управления компонентами механического устройства, свойственны ОС</a:t>
+            </a:r>
+          </a:p>
+        </p:txBody>
+      </p:sp>
+    </p:spTree>
+    <p:extLst>
+      <p:ext uri="{BB962C8B-B14F-4D97-AF65-F5344CB8AC3E}">
+        <p14:creationId xmlns:p14="http://schemas.microsoft.com/office/powerpoint/2010/main" val="617051491"/>
+      </p:ext>
+    </p:extLst>
+  </p:cSld>
+  <p:clrMapOvr>
+    <a:masterClrMapping/>
+  </p:clrMapOvr>
+  <mc:AlternateContent xmlns:mc="http://schemas.openxmlformats.org/markup-compatibility/2006">
+    <mc:Choice xmlns:p14="http://schemas.microsoft.com/office/powerpoint/2010/main" Requires="p14">
+      <p:transition spd="slow" p14:dur="3400">
+        <p14:reveal/>
+      </p:transition>
+    </mc:Choice>
+    <mc:Fallback>
+      <p:transition spd="slow">
+        <p:fade/>
+      </p:transition>
+    </mc:Fallback>
+  </mc:AlternateContent>
+</p:sld>
+</file>
+
+<file path=ppt/slides/slide8.xml><?xml version="1.0" encoding="utf-8"?>
+<p:sld xmlns:a="http://schemas.openxmlformats.org/drawingml/2006/main" xmlns:r="http://schemas.openxmlformats.org/officeDocument/2006/relationships" xmlns:p="http://schemas.openxmlformats.org/presentationml/2006/main">
+  <p:cSld>
+    <p:spTree>
+      <p:nvGrpSpPr>
+        <p:cNvPr id="1" name=""/>
+        <p:cNvGrpSpPr/>
+        <p:nvPr/>
+      </p:nvGrpSpPr>
+      <p:grpSpPr>
+        <a:xfrm>
+          <a:off x="0" y="0"/>
+          <a:ext cx="0" cy="0"/>
+          <a:chOff x="0" y="0"/>
+          <a:chExt cx="0" cy="0"/>
+        </a:xfrm>
+      </p:grpSpPr>
+      <p:sp>
+        <p:nvSpPr>
+          <p:cNvPr id="2" name="Объект 1">
+            <a:extLst>
+              <a:ext uri="{FF2B5EF4-FFF2-40B4-BE49-F238E27FC236}">
+                <a16:creationId xmlns:a16="http://schemas.microsoft.com/office/drawing/2014/main" id="{519B5237-BDF3-DF4F-A32C-E09E9C89111F}"/>
+              </a:ext>
+            </a:extLst>
+          </p:cNvPr>
+          <p:cNvSpPr>
+            <a:spLocks noGrp="1"/>
+          </p:cNvSpPr>
+          <p:nvPr>
+            <p:ph idx="1"/>
+          </p:nvPr>
+        </p:nvSpPr>
+        <p:spPr>
+          <a:xfrm>
+            <a:off x="1371600" y="1353786"/>
+            <a:ext cx="9601200" cy="4513613"/>
+          </a:xfrm>
+        </p:spPr>
+        <p:txBody>
+          <a:bodyPr/>
+          <a:lstStyle/>
+          <a:p>
+            <a:pPr marL="0" indent="0">
+              <a:buNone/>
+            </a:pPr>
+            <a:r>
+              <a:rPr lang="ru-RU" dirty="0">
+                <a:latin typeface="Gabriola" pitchFamily="82" charset="0"/>
+              </a:rPr>
+              <a:t>В 1792 году </a:t>
+            </a:r>
+            <a:r>
+              <a:rPr lang="ru-RU" dirty="0" err="1">
+                <a:latin typeface="Gabriola" pitchFamily="82" charset="0"/>
+              </a:rPr>
+              <a:t>Гаспар</a:t>
+            </a:r>
+            <a:r>
+              <a:rPr lang="ru-RU" dirty="0">
+                <a:latin typeface="Gabriola" pitchFamily="82" charset="0"/>
+              </a:rPr>
+              <a:t> де </a:t>
+            </a:r>
+            <a:r>
+              <a:rPr lang="ru-RU" dirty="0" err="1">
+                <a:latin typeface="Gabriola" pitchFamily="82" charset="0"/>
+              </a:rPr>
+              <a:t>Прони</a:t>
+            </a:r>
+            <a:r>
+              <a:rPr lang="ru-RU" dirty="0">
+                <a:latin typeface="Gabriola" pitchFamily="82" charset="0"/>
+              </a:rPr>
+              <a:t> предложил идею создания «Вычислительной фабрики», производящей десятичные логарифмические и тригонометрические таблицы, на 3-х уровнях:</a:t>
+            </a:r>
+            <a:endParaRPr lang="en-US" dirty="0">
+              <a:latin typeface="Gabriola" pitchFamily="82" charset="0"/>
+            </a:endParaRPr>
+          </a:p>
+          <a:p>
+            <a:pPr>
+              <a:buFont typeface="Arial" panose="020B0604020202020204" pitchFamily="34" charset="0"/>
+              <a:buChar char="•"/>
+            </a:pPr>
+            <a:r>
+              <a:rPr lang="ru-RU" dirty="0">
+                <a:latin typeface="Gabriola" pitchFamily="82" charset="0"/>
+              </a:rPr>
+              <a:t>верхний уровень (аналитический): великие математики занимаются выведением математических выражений, пригодных для численных расчетов;</a:t>
+            </a:r>
+            <a:endParaRPr lang="en-US" dirty="0">
+              <a:latin typeface="Gabriola" pitchFamily="82" charset="0"/>
+            </a:endParaRPr>
+          </a:p>
+          <a:p>
+            <a:pPr>
+              <a:buFont typeface="Arial" panose="020B0604020202020204" pitchFamily="34" charset="0"/>
+              <a:buChar char="•"/>
+            </a:pPr>
+            <a:r>
+              <a:rPr lang="ru-RU" dirty="0">
+                <a:latin typeface="Gabriola" pitchFamily="82" charset="0"/>
+              </a:rPr>
+              <a:t>второй уровень (уровень группировки и упрощения): математики-ассистенты вычисляют значения функций для аргументов;</a:t>
+            </a:r>
+            <a:endParaRPr lang="en-US" dirty="0">
+              <a:latin typeface="Gabriola" pitchFamily="82" charset="0"/>
+            </a:endParaRPr>
+          </a:p>
+          <a:p>
+            <a:pPr>
+              <a:buFont typeface="Arial" panose="020B0604020202020204" pitchFamily="34" charset="0"/>
+              <a:buChar char="•"/>
+            </a:pPr>
+            <a:r>
+              <a:rPr lang="ru-RU" dirty="0">
+                <a:latin typeface="Gabriola" pitchFamily="82" charset="0"/>
+              </a:rPr>
+              <a:t>третий уровень (вычислительный): специально обученные рабочие проводят рутинные расчеты</a:t>
+            </a:r>
+          </a:p>
+        </p:txBody>
+      </p:sp>
+      <p:sp>
+        <p:nvSpPr>
+          <p:cNvPr id="3" name="Заголовок 2">
+            <a:extLst>
+              <a:ext uri="{FF2B5EF4-FFF2-40B4-BE49-F238E27FC236}">
+                <a16:creationId xmlns:a16="http://schemas.microsoft.com/office/drawing/2014/main" id="{8438BE4F-B27A-8544-B69A-CDAB071415C5}"/>
+              </a:ext>
+            </a:extLst>
+          </p:cNvPr>
+          <p:cNvSpPr>
+            <a:spLocks noGrp="1"/>
+          </p:cNvSpPr>
+          <p:nvPr>
+            <p:ph type="title"/>
+          </p:nvPr>
+        </p:nvSpPr>
+        <p:spPr>
+          <a:xfrm>
+            <a:off x="1097280" y="421817"/>
+            <a:ext cx="10058400" cy="741965"/>
+          </a:xfrm>
+        </p:spPr>
+        <p:txBody>
+          <a:bodyPr/>
+          <a:lstStyle/>
+          <a:p>
+            <a:pPr algn="ctr"/>
+            <a:r>
+              <a:rPr lang="ru-RU" dirty="0">
+                <a:latin typeface="Gabriola" pitchFamily="82" charset="0"/>
+              </a:rPr>
+              <a:t>Вычислительная фабрика</a:t>
+            </a:r>
+          </a:p>
+        </p:txBody>
+      </p:sp>
+    </p:spTree>
+    <p:extLst>
+      <p:ext uri="{BB962C8B-B14F-4D97-AF65-F5344CB8AC3E}">
+        <p14:creationId xmlns:p14="http://schemas.microsoft.com/office/powerpoint/2010/main" val="994603439"/>
+      </p:ext>
+    </p:extLst>
+  </p:cSld>
+  <p:clrMapOvr>
+    <a:masterClrMapping/>
+  </p:clrMapOvr>
+  <mc:AlternateContent xmlns:mc="http://schemas.openxmlformats.org/markup-compatibility/2006">
+    <mc:Choice xmlns:p14="http://schemas.microsoft.com/office/powerpoint/2010/main" Requires="p14">
+      <p:transition spd="slow" p14:dur="3400">
+        <p14:reveal/>
+      </p:transition>
+    </mc:Choice>
+    <mc:Fallback>
+      <p:transition spd="slow">
+        <p:fade/>
+      </p:transition>
+    </mc:Fallback>
+  </mc:AlternateContent>
 </p:sld>
 </file>
 
@@ -15046,6 +15490,24 @@
 </file>
 
 <file path=customXml/item1.xml><?xml version="1.0" encoding="utf-8"?>
+<p:properties xmlns:p="http://schemas.microsoft.com/office/2006/metadata/properties" xmlns:xsi="http://www.w3.org/2001/XMLSchema-instance" xmlns:pc="http://schemas.microsoft.com/office/infopath/2007/PartnerControls">
+  <documentManagement>
+    <Status xmlns="71af3243-3dd4-4a8d-8c0d-dd76da1f02a5">Not started</Status>
+    <MediaServiceKeyPoints xmlns="71af3243-3dd4-4a8d-8c0d-dd76da1f02a5" xsi:nil="true"/>
+  </documentManagement>
+</p:properties>
+</file>
+
+<file path=customXml/item2.xml><?xml version="1.0" encoding="utf-8"?>
+<?mso-contentType ?>
+<FormTemplates xmlns="http://schemas.microsoft.com/sharepoint/v3/contenttype/forms">
+  <Display>DocumentLibraryForm</Display>
+  <Edit>DocumentLibraryForm</Edit>
+  <New>DocumentLibraryForm</New>
+</FormTemplates>
+</file>
+
+<file path=customXml/item3.xml><?xml version="1.0" encoding="utf-8"?>
 <ct:contentTypeSchema xmlns:ct="http://schemas.microsoft.com/office/2006/metadata/contentType" xmlns:ma="http://schemas.microsoft.com/office/2006/metadata/properties/metaAttributes" ct:_="" ma:_="" ma:contentTypeName="Document" ma:contentTypeID="0x01010079F111ED35F8CC479449609E8A0923A6" ma:contentTypeVersion="12" ma:contentTypeDescription="Create a new document." ma:contentTypeScope="" ma:versionID="fa6e671f1cd7e4d96ff9652be322dd5e">
   <xsd:schema xmlns:xsd="http://www.w3.org/2001/XMLSchema" xmlns:xs="http://www.w3.org/2001/XMLSchema" xmlns:p="http://schemas.microsoft.com/office/2006/metadata/properties" xmlns:ns2="71af3243-3dd4-4a8d-8c0d-dd76da1f02a5" xmlns:ns3="16c05727-aa75-4e4a-9b5f-8a80a1165891" targetNamespace="http://schemas.microsoft.com/office/2006/metadata/properties" ma:root="true" ma:fieldsID="4e2496f70b101db0b8013f30a071bbf7" ns2:_="" ns3:_="">
     <xsd:import namespace="71af3243-3dd4-4a8d-8c0d-dd76da1f02a5"/>
@@ -15266,25 +15728,25 @@
 </ct:contentTypeSchema>
 </file>
 
-<file path=customXml/item2.xml><?xml version="1.0" encoding="utf-8"?>
-<?mso-contentType ?>
-<FormTemplates xmlns="http://schemas.microsoft.com/sharepoint/v3/contenttype/forms">
-  <Display>DocumentLibraryForm</Display>
-  <Edit>DocumentLibraryForm</Edit>
-  <New>DocumentLibraryForm</New>
-</FormTemplates>
+<file path=customXml/itemProps1.xml><?xml version="1.0" encoding="utf-8"?>
+<ds:datastoreItem xmlns:ds="http://schemas.openxmlformats.org/officeDocument/2006/customXml" ds:itemID="{38F4328E-77DF-41E8-952F-124AE19F1F7C}">
+  <ds:schemaRefs>
+    <ds:schemaRef ds:uri="http://schemas.microsoft.com/office/2006/metadata/properties"/>
+    <ds:schemaRef ds:uri="http://schemas.microsoft.com/office/infopath/2007/PartnerControls"/>
+    <ds:schemaRef ds:uri="71af3243-3dd4-4a8d-8c0d-dd76da1f02a5"/>
+  </ds:schemaRefs>
+</ds:datastoreItem>
 </file>
 
-<file path=customXml/item3.xml><?xml version="1.0" encoding="utf-8"?>
-<p:properties xmlns:p="http://schemas.microsoft.com/office/2006/metadata/properties" xmlns:xsi="http://www.w3.org/2001/XMLSchema-instance" xmlns:pc="http://schemas.microsoft.com/office/infopath/2007/PartnerControls">
-  <documentManagement>
-    <Status xmlns="71af3243-3dd4-4a8d-8c0d-dd76da1f02a5">Not started</Status>
-    <MediaServiceKeyPoints xmlns="71af3243-3dd4-4a8d-8c0d-dd76da1f02a5" xsi:nil="true"/>
-  </documentManagement>
-</p:properties>
+<file path=customXml/itemProps2.xml><?xml version="1.0" encoding="utf-8"?>
+<ds:datastoreItem xmlns:ds="http://schemas.openxmlformats.org/officeDocument/2006/customXml" ds:itemID="{6A7FA506-1E93-4CA4-B270-1F08FD18C366}">
+  <ds:schemaRefs>
+    <ds:schemaRef ds:uri="http://schemas.microsoft.com/sharepoint/v3/contenttype/forms"/>
+  </ds:schemaRefs>
+</ds:datastoreItem>
 </file>
 
-<file path=customXml/itemProps1.xml><?xml version="1.0" encoding="utf-8"?>
+<file path=customXml/itemProps3.xml><?xml version="1.0" encoding="utf-8"?>
 <ds:datastoreItem xmlns:ds="http://schemas.openxmlformats.org/officeDocument/2006/customXml" ds:itemID="{1F2FE978-FCBC-4C90-A410-B547AA706062}">
   <ds:schemaRefs>
     <ds:schemaRef ds:uri="http://schemas.microsoft.com/office/2006/metadata/contentType"/>
@@ -15301,22 +15763,4 @@
     <ds:schemaRef ds:uri="http://schemas.microsoft.com/internal/obd"/>
   </ds:schemaRefs>
 </ds:datastoreItem>
-</file>
-
-<file path=customXml/itemProps2.xml><?xml version="1.0" encoding="utf-8"?>
-<ds:datastoreItem xmlns:ds="http://schemas.openxmlformats.org/officeDocument/2006/customXml" ds:itemID="{6A7FA506-1E93-4CA4-B270-1F08FD18C366}">
-  <ds:schemaRefs>
-    <ds:schemaRef ds:uri="http://schemas.microsoft.com/sharepoint/v3/contenttype/forms"/>
-  </ds:schemaRefs>
-</ds:datastoreItem>
-</file>
-
-<file path=customXml/itemProps3.xml><?xml version="1.0" encoding="utf-8"?>
-<ds:datastoreItem xmlns:ds="http://schemas.openxmlformats.org/officeDocument/2006/customXml" ds:itemID="{38F4328E-77DF-41E8-952F-124AE19F1F7C}">
-  <ds:schemaRefs>
-    <ds:schemaRef ds:uri="http://schemas.microsoft.com/office/2006/metadata/properties"/>
-    <ds:schemaRef ds:uri="http://schemas.microsoft.com/office/infopath/2007/PartnerControls"/>
-    <ds:schemaRef ds:uri="71af3243-3dd4-4a8d-8c0d-dd76da1f02a5"/>
-  </ds:schemaRefs>
-</ds:datastoreItem>
 </file>
</xml_diff>